<commit_message>
Versao final do ppt
</commit_message>
<xml_diff>
--- a/Project/ApresentacaoFinal.pptx
+++ b/Project/ApresentacaoFinal.pptx
@@ -10352,6 +10352,432 @@
       </p:grpSpPr>
       <p:sp>
         <p:nvSpPr>
+          <p:cNvPr id="7" name="Google Shape;478;p30">
+            <a:extLst>
+              <a:ext uri="{FF2B5EF4-FFF2-40B4-BE49-F238E27FC236}">
+                <a16:creationId xmlns:a16="http://schemas.microsoft.com/office/drawing/2014/main" id="{25AA9270-7427-4C58-8E3E-2396F3CB96F6}"/>
+              </a:ext>
+            </a:extLst>
+          </p:cNvPr>
+          <p:cNvSpPr/>
+          <p:nvPr/>
+        </p:nvSpPr>
+        <p:spPr>
+          <a:xfrm flipH="1">
+            <a:off x="801501" y="1036554"/>
+            <a:ext cx="10588997" cy="5084597"/>
+          </a:xfrm>
+          <a:custGeom>
+            <a:avLst/>
+            <a:gdLst/>
+            <a:ahLst/>
+            <a:cxnLst/>
+            <a:rect l="l" t="t" r="r" b="b"/>
+            <a:pathLst>
+              <a:path w="57009" h="36369" extrusionOk="0">
+                <a:moveTo>
+                  <a:pt x="2207" y="0"/>
+                </a:moveTo>
+                <a:cubicBezTo>
+                  <a:pt x="997" y="0"/>
+                  <a:pt x="0" y="926"/>
+                  <a:pt x="0" y="2136"/>
+                </a:cubicBezTo>
+                <a:lnTo>
+                  <a:pt x="0" y="34233"/>
+                </a:lnTo>
+                <a:cubicBezTo>
+                  <a:pt x="0" y="35443"/>
+                  <a:pt x="997" y="36369"/>
+                  <a:pt x="2207" y="36369"/>
+                </a:cubicBezTo>
+                <a:lnTo>
+                  <a:pt x="54802" y="36369"/>
+                </a:lnTo>
+                <a:cubicBezTo>
+                  <a:pt x="56012" y="36369"/>
+                  <a:pt x="57008" y="35443"/>
+                  <a:pt x="57008" y="34233"/>
+                </a:cubicBezTo>
+                <a:lnTo>
+                  <a:pt x="57008" y="2136"/>
+                </a:lnTo>
+                <a:cubicBezTo>
+                  <a:pt x="57008" y="926"/>
+                  <a:pt x="56012" y="0"/>
+                  <a:pt x="54802" y="0"/>
+                </a:cubicBezTo>
+                <a:close/>
+              </a:path>
+            </a:pathLst>
+          </a:custGeom>
+          <a:solidFill>
+            <a:srgbClr val="FEFFFF"/>
+          </a:solidFill>
+          <a:ln w="9525" cap="flat" cmpd="sng">
+            <a:solidFill>
+              <a:srgbClr val="C8D7EE"/>
+            </a:solidFill>
+            <a:prstDash val="solid"/>
+            <a:round/>
+            <a:headEnd type="none" w="sm" len="sm"/>
+            <a:tailEnd type="none" w="sm" len="sm"/>
+          </a:ln>
+          <a:effectLst>
+            <a:outerShdw blurRad="57150" dist="66675" dir="3780000" algn="bl" rotWithShape="0">
+              <a:srgbClr val="000000">
+                <a:alpha val="20000"/>
+              </a:srgbClr>
+            </a:outerShdw>
+          </a:effectLst>
+        </p:spPr>
+        <p:txBody>
+          <a:bodyPr spcFirstLastPara="1" wrap="square" lIns="91425" tIns="91425" rIns="91425" bIns="91425" anchor="ctr" anchorCtr="0">
+            <a:noAutofit/>
+          </a:bodyPr>
+          <a:lstStyle/>
+          <a:p>
+            <a:pPr marL="0" marR="0" lvl="0" indent="0" defTabSz="914400" eaLnBrk="1" fontAlgn="auto" latinLnBrk="0" hangingPunct="1">
+              <a:lnSpc>
+                <a:spcPct val="100000"/>
+              </a:lnSpc>
+              <a:spcBef>
+                <a:spcPts val="0"/>
+              </a:spcBef>
+              <a:spcAft>
+                <a:spcPts val="0"/>
+              </a:spcAft>
+              <a:buClr>
+                <a:srgbClr val="000000"/>
+              </a:buClr>
+              <a:buSzTx/>
+              <a:buFont typeface="Arial"/>
+              <a:buNone/>
+              <a:tabLst/>
+              <a:defRPr/>
+            </a:pPr>
+            <a:endParaRPr kumimoji="0" sz="1400" b="0" i="0" u="none" strike="noStrike" kern="0" cap="none" spc="0" normalizeH="0" baseline="0" noProof="0">
+              <a:ln>
+                <a:noFill/>
+              </a:ln>
+              <a:solidFill>
+                <a:srgbClr val="000000"/>
+              </a:solidFill>
+              <a:effectLst/>
+              <a:uLnTx/>
+              <a:uFillTx/>
+              <a:latin typeface="Arial"/>
+              <a:cs typeface="Arial"/>
+              <a:sym typeface="Arial"/>
+            </a:endParaRPr>
+          </a:p>
+        </p:txBody>
+      </p:sp>
+      <p:sp>
+        <p:nvSpPr>
+          <p:cNvPr id="8" name="Google Shape;479;p30">
+            <a:extLst>
+              <a:ext uri="{FF2B5EF4-FFF2-40B4-BE49-F238E27FC236}">
+                <a16:creationId xmlns:a16="http://schemas.microsoft.com/office/drawing/2014/main" id="{154D074E-69A8-48CD-AFB3-B0C07D2B3CE5}"/>
+              </a:ext>
+            </a:extLst>
+          </p:cNvPr>
+          <p:cNvSpPr/>
+          <p:nvPr/>
+        </p:nvSpPr>
+        <p:spPr>
+          <a:xfrm flipH="1">
+            <a:off x="10893377" y="1158636"/>
+            <a:ext cx="338897" cy="291807"/>
+          </a:xfrm>
+          <a:custGeom>
+            <a:avLst/>
+            <a:gdLst/>
+            <a:ahLst/>
+            <a:cxnLst/>
+            <a:rect l="l" t="t" r="r" b="b"/>
+            <a:pathLst>
+              <a:path w="3630" h="3170" extrusionOk="0">
+                <a:moveTo>
+                  <a:pt x="2064" y="1"/>
+                </a:moveTo>
+                <a:cubicBezTo>
+                  <a:pt x="712" y="1"/>
+                  <a:pt x="0" y="1709"/>
+                  <a:pt x="997" y="2705"/>
+                </a:cubicBezTo>
+                <a:cubicBezTo>
+                  <a:pt x="1294" y="3026"/>
+                  <a:pt x="1673" y="3170"/>
+                  <a:pt x="2050" y="3170"/>
+                </a:cubicBezTo>
+                <a:cubicBezTo>
+                  <a:pt x="2845" y="3170"/>
+                  <a:pt x="3630" y="2532"/>
+                  <a:pt x="3630" y="1566"/>
+                </a:cubicBezTo>
+                <a:cubicBezTo>
+                  <a:pt x="3630" y="712"/>
+                  <a:pt x="2918" y="72"/>
+                  <a:pt x="2064" y="1"/>
+                </a:cubicBezTo>
+                <a:close/>
+              </a:path>
+            </a:pathLst>
+          </a:custGeom>
+          <a:solidFill>
+            <a:srgbClr val="CB1B4A"/>
+          </a:solidFill>
+          <a:ln>
+            <a:noFill/>
+          </a:ln>
+        </p:spPr>
+        <p:txBody>
+          <a:bodyPr spcFirstLastPara="1" wrap="square" lIns="91425" tIns="91425" rIns="91425" bIns="91425" anchor="ctr" anchorCtr="0">
+            <a:noAutofit/>
+          </a:bodyPr>
+          <a:lstStyle/>
+          <a:p>
+            <a:pPr marL="0" marR="0" lvl="0" indent="0" defTabSz="914400" eaLnBrk="1" fontAlgn="auto" latinLnBrk="0" hangingPunct="1">
+              <a:lnSpc>
+                <a:spcPct val="100000"/>
+              </a:lnSpc>
+              <a:spcBef>
+                <a:spcPts val="0"/>
+              </a:spcBef>
+              <a:spcAft>
+                <a:spcPts val="0"/>
+              </a:spcAft>
+              <a:buClr>
+                <a:srgbClr val="000000"/>
+              </a:buClr>
+              <a:buSzTx/>
+              <a:buFont typeface="Arial"/>
+              <a:buNone/>
+              <a:tabLst/>
+              <a:defRPr/>
+            </a:pPr>
+            <a:endParaRPr kumimoji="0" sz="1400" b="0" i="0" u="none" strike="noStrike" kern="0" cap="none" spc="0" normalizeH="0" baseline="0" noProof="0">
+              <a:ln>
+                <a:noFill/>
+              </a:ln>
+              <a:solidFill>
+                <a:srgbClr val="000000"/>
+              </a:solidFill>
+              <a:effectLst/>
+              <a:uLnTx/>
+              <a:uFillTx/>
+              <a:latin typeface="Arial"/>
+              <a:cs typeface="Arial"/>
+              <a:sym typeface="Arial"/>
+            </a:endParaRPr>
+          </a:p>
+        </p:txBody>
+      </p:sp>
+      <p:sp>
+        <p:nvSpPr>
+          <p:cNvPr id="10" name="Google Shape;480;p30">
+            <a:extLst>
+              <a:ext uri="{FF2B5EF4-FFF2-40B4-BE49-F238E27FC236}">
+                <a16:creationId xmlns:a16="http://schemas.microsoft.com/office/drawing/2014/main" id="{2F40CA09-2D3F-4737-A588-981D170E7433}"/>
+              </a:ext>
+            </a:extLst>
+          </p:cNvPr>
+          <p:cNvSpPr/>
+          <p:nvPr/>
+        </p:nvSpPr>
+        <p:spPr>
+          <a:xfrm flipH="1">
+            <a:off x="10448146" y="1158636"/>
+            <a:ext cx="345617" cy="291807"/>
+          </a:xfrm>
+          <a:custGeom>
+            <a:avLst/>
+            <a:gdLst/>
+            <a:ahLst/>
+            <a:cxnLst/>
+            <a:rect l="l" t="t" r="r" b="b"/>
+            <a:pathLst>
+              <a:path w="3702" h="3170" extrusionOk="0">
+                <a:moveTo>
+                  <a:pt x="2136" y="1"/>
+                </a:moveTo>
+                <a:cubicBezTo>
+                  <a:pt x="712" y="72"/>
+                  <a:pt x="1" y="1709"/>
+                  <a:pt x="997" y="2705"/>
+                </a:cubicBezTo>
+                <a:cubicBezTo>
+                  <a:pt x="1318" y="3026"/>
+                  <a:pt x="1712" y="3170"/>
+                  <a:pt x="2100" y="3170"/>
+                </a:cubicBezTo>
+                <a:cubicBezTo>
+                  <a:pt x="2916" y="3170"/>
+                  <a:pt x="3701" y="2532"/>
+                  <a:pt x="3701" y="1566"/>
+                </a:cubicBezTo>
+                <a:cubicBezTo>
+                  <a:pt x="3701" y="712"/>
+                  <a:pt x="2990" y="1"/>
+                  <a:pt x="2136" y="1"/>
+                </a:cubicBezTo>
+                <a:close/>
+              </a:path>
+            </a:pathLst>
+          </a:custGeom>
+          <a:solidFill>
+            <a:srgbClr val="258688"/>
+          </a:solidFill>
+          <a:ln>
+            <a:noFill/>
+          </a:ln>
+        </p:spPr>
+        <p:txBody>
+          <a:bodyPr spcFirstLastPara="1" wrap="square" lIns="91425" tIns="91425" rIns="91425" bIns="91425" anchor="ctr" anchorCtr="0">
+            <a:noAutofit/>
+          </a:bodyPr>
+          <a:lstStyle/>
+          <a:p>
+            <a:pPr marL="0" marR="0" lvl="0" indent="0" defTabSz="914400" eaLnBrk="1" fontAlgn="auto" latinLnBrk="0" hangingPunct="1">
+              <a:lnSpc>
+                <a:spcPct val="100000"/>
+              </a:lnSpc>
+              <a:spcBef>
+                <a:spcPts val="0"/>
+              </a:spcBef>
+              <a:spcAft>
+                <a:spcPts val="0"/>
+              </a:spcAft>
+              <a:buClr>
+                <a:srgbClr val="000000"/>
+              </a:buClr>
+              <a:buSzTx/>
+              <a:buFont typeface="Arial"/>
+              <a:buNone/>
+              <a:tabLst/>
+              <a:defRPr/>
+            </a:pPr>
+            <a:endParaRPr kumimoji="0" sz="1400" b="0" i="0" u="none" strike="noStrike" kern="0" cap="none" spc="0" normalizeH="0" baseline="0" noProof="0">
+              <a:ln>
+                <a:noFill/>
+              </a:ln>
+              <a:solidFill>
+                <a:srgbClr val="000000"/>
+              </a:solidFill>
+              <a:effectLst/>
+              <a:uLnTx/>
+              <a:uFillTx/>
+              <a:latin typeface="Arial"/>
+              <a:cs typeface="Arial"/>
+              <a:sym typeface="Arial"/>
+            </a:endParaRPr>
+          </a:p>
+        </p:txBody>
+      </p:sp>
+      <p:sp>
+        <p:nvSpPr>
+          <p:cNvPr id="11" name="Google Shape;481;p30">
+            <a:extLst>
+              <a:ext uri="{FF2B5EF4-FFF2-40B4-BE49-F238E27FC236}">
+                <a16:creationId xmlns:a16="http://schemas.microsoft.com/office/drawing/2014/main" id="{72FAA3B2-076C-49DD-9659-8A12E144B51A}"/>
+              </a:ext>
+            </a:extLst>
+          </p:cNvPr>
+          <p:cNvSpPr/>
+          <p:nvPr/>
+        </p:nvSpPr>
+        <p:spPr>
+          <a:xfrm flipH="1">
+            <a:off x="10003007" y="1158636"/>
+            <a:ext cx="338897" cy="291807"/>
+          </a:xfrm>
+          <a:custGeom>
+            <a:avLst/>
+            <a:gdLst/>
+            <a:ahLst/>
+            <a:cxnLst/>
+            <a:rect l="l" t="t" r="r" b="b"/>
+            <a:pathLst>
+              <a:path w="3630" h="3170" extrusionOk="0">
+                <a:moveTo>
+                  <a:pt x="2135" y="1"/>
+                </a:moveTo>
+                <a:cubicBezTo>
+                  <a:pt x="712" y="1"/>
+                  <a:pt x="0" y="1709"/>
+                  <a:pt x="997" y="2705"/>
+                </a:cubicBezTo>
+                <a:cubicBezTo>
+                  <a:pt x="1317" y="3026"/>
+                  <a:pt x="1704" y="3170"/>
+                  <a:pt x="2082" y="3170"/>
+                </a:cubicBezTo>
+                <a:cubicBezTo>
+                  <a:pt x="2877" y="3170"/>
+                  <a:pt x="3630" y="2532"/>
+                  <a:pt x="3630" y="1566"/>
+                </a:cubicBezTo>
+                <a:cubicBezTo>
+                  <a:pt x="3630" y="712"/>
+                  <a:pt x="2989" y="72"/>
+                  <a:pt x="2135" y="1"/>
+                </a:cubicBezTo>
+                <a:close/>
+              </a:path>
+            </a:pathLst>
+          </a:custGeom>
+          <a:solidFill>
+            <a:srgbClr val="42AFB6"/>
+          </a:solidFill>
+          <a:ln>
+            <a:noFill/>
+          </a:ln>
+        </p:spPr>
+        <p:txBody>
+          <a:bodyPr spcFirstLastPara="1" wrap="square" lIns="91425" tIns="91425" rIns="91425" bIns="91425" anchor="ctr" anchorCtr="0">
+            <a:noAutofit/>
+          </a:bodyPr>
+          <a:lstStyle/>
+          <a:p>
+            <a:pPr marL="0" marR="0" lvl="0" indent="0" defTabSz="914400" eaLnBrk="1" fontAlgn="auto" latinLnBrk="0" hangingPunct="1">
+              <a:lnSpc>
+                <a:spcPct val="100000"/>
+              </a:lnSpc>
+              <a:spcBef>
+                <a:spcPts val="0"/>
+              </a:spcBef>
+              <a:spcAft>
+                <a:spcPts val="0"/>
+              </a:spcAft>
+              <a:buClr>
+                <a:srgbClr val="000000"/>
+              </a:buClr>
+              <a:buSzTx/>
+              <a:buFont typeface="Arial"/>
+              <a:buNone/>
+              <a:tabLst/>
+              <a:defRPr/>
+            </a:pPr>
+            <a:endParaRPr kumimoji="0" sz="1400" b="0" i="0" u="none" strike="noStrike" kern="0" cap="none" spc="0" normalizeH="0" baseline="0" noProof="0">
+              <a:ln>
+                <a:noFill/>
+              </a:ln>
+              <a:solidFill>
+                <a:srgbClr val="000000"/>
+              </a:solidFill>
+              <a:effectLst/>
+              <a:uLnTx/>
+              <a:uFillTx/>
+              <a:latin typeface="Arial"/>
+              <a:cs typeface="Arial"/>
+              <a:sym typeface="Arial"/>
+            </a:endParaRPr>
+          </a:p>
+        </p:txBody>
+      </p:sp>
+      <p:sp>
+        <p:nvSpPr>
           <p:cNvPr id="20" name="Oval 19">
             <a:extLst>
               <a:ext uri="{FF2B5EF4-FFF2-40B4-BE49-F238E27FC236}">
@@ -10568,7 +10994,7 @@
         </p:nvSpPr>
         <p:spPr>
           <a:xfrm>
-            <a:off x="5699096" y="5596350"/>
+            <a:off x="5699096" y="5373067"/>
             <a:ext cx="793807" cy="523220"/>
           </a:xfrm>
           <a:prstGeom prst="rect">
@@ -49089,6 +49515,453 @@
           <a:chExt cx="0" cy="0"/>
         </a:xfrm>
       </p:grpSpPr>
+      <p:grpSp>
+        <p:nvGrpSpPr>
+          <p:cNvPr id="2" name="Agrupar 1">
+            <a:extLst>
+              <a:ext uri="{FF2B5EF4-FFF2-40B4-BE49-F238E27FC236}">
+                <a16:creationId xmlns:a16="http://schemas.microsoft.com/office/drawing/2014/main" id="{2CE95277-EAC6-42F5-ADFD-A7650C5DDFB5}"/>
+              </a:ext>
+            </a:extLst>
+          </p:cNvPr>
+          <p:cNvGrpSpPr/>
+          <p:nvPr/>
+        </p:nvGrpSpPr>
+        <p:grpSpPr>
+          <a:xfrm>
+            <a:off x="801501" y="1036554"/>
+            <a:ext cx="10588997" cy="5084597"/>
+            <a:chOff x="801501" y="1210790"/>
+            <a:chExt cx="10588997" cy="4906374"/>
+          </a:xfrm>
+        </p:grpSpPr>
+        <p:sp>
+          <p:nvSpPr>
+            <p:cNvPr id="18" name="Google Shape;478;p30">
+              <a:extLst>
+                <a:ext uri="{FF2B5EF4-FFF2-40B4-BE49-F238E27FC236}">
+                  <a16:creationId xmlns:a16="http://schemas.microsoft.com/office/drawing/2014/main" id="{4E8D4E54-3B0C-4D8B-AC57-81004B106C55}"/>
+                </a:ext>
+              </a:extLst>
+            </p:cNvPr>
+            <p:cNvSpPr/>
+            <p:nvPr/>
+          </p:nvSpPr>
+          <p:spPr>
+            <a:xfrm flipH="1">
+              <a:off x="801501" y="1210790"/>
+              <a:ext cx="10588997" cy="4906374"/>
+            </a:xfrm>
+            <a:custGeom>
+              <a:avLst/>
+              <a:gdLst/>
+              <a:ahLst/>
+              <a:cxnLst/>
+              <a:rect l="l" t="t" r="r" b="b"/>
+              <a:pathLst>
+                <a:path w="57009" h="36369" extrusionOk="0">
+                  <a:moveTo>
+                    <a:pt x="2207" y="0"/>
+                  </a:moveTo>
+                  <a:cubicBezTo>
+                    <a:pt x="997" y="0"/>
+                    <a:pt x="0" y="926"/>
+                    <a:pt x="0" y="2136"/>
+                  </a:cubicBezTo>
+                  <a:lnTo>
+                    <a:pt x="0" y="34233"/>
+                  </a:lnTo>
+                  <a:cubicBezTo>
+                    <a:pt x="0" y="35443"/>
+                    <a:pt x="997" y="36369"/>
+                    <a:pt x="2207" y="36369"/>
+                  </a:cubicBezTo>
+                  <a:lnTo>
+                    <a:pt x="54802" y="36369"/>
+                  </a:lnTo>
+                  <a:cubicBezTo>
+                    <a:pt x="56012" y="36369"/>
+                    <a:pt x="57008" y="35443"/>
+                    <a:pt x="57008" y="34233"/>
+                  </a:cubicBezTo>
+                  <a:lnTo>
+                    <a:pt x="57008" y="2136"/>
+                  </a:lnTo>
+                  <a:cubicBezTo>
+                    <a:pt x="57008" y="926"/>
+                    <a:pt x="56012" y="0"/>
+                    <a:pt x="54802" y="0"/>
+                  </a:cubicBezTo>
+                  <a:close/>
+                </a:path>
+              </a:pathLst>
+            </a:custGeom>
+            <a:solidFill>
+              <a:srgbClr val="FEFFFF"/>
+            </a:solidFill>
+            <a:ln w="9525" cap="flat" cmpd="sng">
+              <a:solidFill>
+                <a:srgbClr val="C8D7EE"/>
+              </a:solidFill>
+              <a:prstDash val="solid"/>
+              <a:round/>
+              <a:headEnd type="none" w="sm" len="sm"/>
+              <a:tailEnd type="none" w="sm" len="sm"/>
+            </a:ln>
+            <a:effectLst>
+              <a:outerShdw blurRad="57150" dist="66675" dir="3780000" algn="bl" rotWithShape="0">
+                <a:srgbClr val="000000">
+                  <a:alpha val="20000"/>
+                </a:srgbClr>
+              </a:outerShdw>
+            </a:effectLst>
+          </p:spPr>
+          <p:txBody>
+            <a:bodyPr spcFirstLastPara="1" wrap="square" lIns="91425" tIns="91425" rIns="91425" bIns="91425" anchor="ctr" anchorCtr="0">
+              <a:noAutofit/>
+            </a:bodyPr>
+            <a:lstStyle/>
+            <a:p>
+              <a:pPr marL="0" marR="0" lvl="0" indent="0" defTabSz="914400" eaLnBrk="1" fontAlgn="auto" latinLnBrk="0" hangingPunct="1">
+                <a:lnSpc>
+                  <a:spcPct val="100000"/>
+                </a:lnSpc>
+                <a:spcBef>
+                  <a:spcPts val="0"/>
+                </a:spcBef>
+                <a:spcAft>
+                  <a:spcPts val="0"/>
+                </a:spcAft>
+                <a:buClr>
+                  <a:srgbClr val="000000"/>
+                </a:buClr>
+                <a:buSzTx/>
+                <a:buFont typeface="Arial"/>
+                <a:buNone/>
+                <a:tabLst/>
+                <a:defRPr/>
+              </a:pPr>
+              <a:endParaRPr kumimoji="0" sz="1400" b="0" i="0" u="none" strike="noStrike" kern="0" cap="none" spc="0" normalizeH="0" baseline="0" noProof="0">
+                <a:ln>
+                  <a:noFill/>
+                </a:ln>
+                <a:solidFill>
+                  <a:srgbClr val="000000"/>
+                </a:solidFill>
+                <a:effectLst/>
+                <a:uLnTx/>
+                <a:uFillTx/>
+                <a:latin typeface="Arial"/>
+                <a:cs typeface="Arial"/>
+                <a:sym typeface="Arial"/>
+              </a:endParaRPr>
+            </a:p>
+          </p:txBody>
+        </p:sp>
+        <p:sp>
+          <p:nvSpPr>
+            <p:cNvPr id="19" name="Google Shape;479;p30">
+              <a:extLst>
+                <a:ext uri="{FF2B5EF4-FFF2-40B4-BE49-F238E27FC236}">
+                  <a16:creationId xmlns:a16="http://schemas.microsoft.com/office/drawing/2014/main" id="{2D3CE134-91F7-495B-A98D-A27BED786D4D}"/>
+                </a:ext>
+              </a:extLst>
+            </p:cNvPr>
+            <p:cNvSpPr/>
+            <p:nvPr/>
+          </p:nvSpPr>
+          <p:spPr>
+            <a:xfrm flipH="1">
+              <a:off x="10893377" y="1328593"/>
+              <a:ext cx="338897" cy="281579"/>
+            </a:xfrm>
+            <a:custGeom>
+              <a:avLst/>
+              <a:gdLst/>
+              <a:ahLst/>
+              <a:cxnLst/>
+              <a:rect l="l" t="t" r="r" b="b"/>
+              <a:pathLst>
+                <a:path w="3630" h="3170" extrusionOk="0">
+                  <a:moveTo>
+                    <a:pt x="2064" y="1"/>
+                  </a:moveTo>
+                  <a:cubicBezTo>
+                    <a:pt x="712" y="1"/>
+                    <a:pt x="0" y="1709"/>
+                    <a:pt x="997" y="2705"/>
+                  </a:cubicBezTo>
+                  <a:cubicBezTo>
+                    <a:pt x="1294" y="3026"/>
+                    <a:pt x="1673" y="3170"/>
+                    <a:pt x="2050" y="3170"/>
+                  </a:cubicBezTo>
+                  <a:cubicBezTo>
+                    <a:pt x="2845" y="3170"/>
+                    <a:pt x="3630" y="2532"/>
+                    <a:pt x="3630" y="1566"/>
+                  </a:cubicBezTo>
+                  <a:cubicBezTo>
+                    <a:pt x="3630" y="712"/>
+                    <a:pt x="2918" y="72"/>
+                    <a:pt x="2064" y="1"/>
+                  </a:cubicBezTo>
+                  <a:close/>
+                </a:path>
+              </a:pathLst>
+            </a:custGeom>
+            <a:solidFill>
+              <a:srgbClr val="CB1B4A"/>
+            </a:solidFill>
+            <a:ln>
+              <a:noFill/>
+            </a:ln>
+          </p:spPr>
+          <p:txBody>
+            <a:bodyPr spcFirstLastPara="1" wrap="square" lIns="91425" tIns="91425" rIns="91425" bIns="91425" anchor="ctr" anchorCtr="0">
+              <a:noAutofit/>
+            </a:bodyPr>
+            <a:lstStyle/>
+            <a:p>
+              <a:pPr marL="0" marR="0" lvl="0" indent="0" defTabSz="914400" eaLnBrk="1" fontAlgn="auto" latinLnBrk="0" hangingPunct="1">
+                <a:lnSpc>
+                  <a:spcPct val="100000"/>
+                </a:lnSpc>
+                <a:spcBef>
+                  <a:spcPts val="0"/>
+                </a:spcBef>
+                <a:spcAft>
+                  <a:spcPts val="0"/>
+                </a:spcAft>
+                <a:buClr>
+                  <a:srgbClr val="000000"/>
+                </a:buClr>
+                <a:buSzTx/>
+                <a:buFont typeface="Arial"/>
+                <a:buNone/>
+                <a:tabLst/>
+                <a:defRPr/>
+              </a:pPr>
+              <a:endParaRPr kumimoji="0" sz="1400" b="0" i="0" u="none" strike="noStrike" kern="0" cap="none" spc="0" normalizeH="0" baseline="0" noProof="0">
+                <a:ln>
+                  <a:noFill/>
+                </a:ln>
+                <a:solidFill>
+                  <a:srgbClr val="000000"/>
+                </a:solidFill>
+                <a:effectLst/>
+                <a:uLnTx/>
+                <a:uFillTx/>
+                <a:latin typeface="Arial"/>
+                <a:cs typeface="Arial"/>
+                <a:sym typeface="Arial"/>
+              </a:endParaRPr>
+            </a:p>
+          </p:txBody>
+        </p:sp>
+        <p:sp>
+          <p:nvSpPr>
+            <p:cNvPr id="21" name="Google Shape;480;p30">
+              <a:extLst>
+                <a:ext uri="{FF2B5EF4-FFF2-40B4-BE49-F238E27FC236}">
+                  <a16:creationId xmlns:a16="http://schemas.microsoft.com/office/drawing/2014/main" id="{E13E0FA6-C631-4E5A-AB7C-431DCCAF2022}"/>
+                </a:ext>
+              </a:extLst>
+            </p:cNvPr>
+            <p:cNvSpPr/>
+            <p:nvPr/>
+          </p:nvSpPr>
+          <p:spPr>
+            <a:xfrm flipH="1">
+              <a:off x="10448146" y="1328593"/>
+              <a:ext cx="345617" cy="281579"/>
+            </a:xfrm>
+            <a:custGeom>
+              <a:avLst/>
+              <a:gdLst/>
+              <a:ahLst/>
+              <a:cxnLst/>
+              <a:rect l="l" t="t" r="r" b="b"/>
+              <a:pathLst>
+                <a:path w="3702" h="3170" extrusionOk="0">
+                  <a:moveTo>
+                    <a:pt x="2136" y="1"/>
+                  </a:moveTo>
+                  <a:cubicBezTo>
+                    <a:pt x="712" y="72"/>
+                    <a:pt x="1" y="1709"/>
+                    <a:pt x="997" y="2705"/>
+                  </a:cubicBezTo>
+                  <a:cubicBezTo>
+                    <a:pt x="1318" y="3026"/>
+                    <a:pt x="1712" y="3170"/>
+                    <a:pt x="2100" y="3170"/>
+                  </a:cubicBezTo>
+                  <a:cubicBezTo>
+                    <a:pt x="2916" y="3170"/>
+                    <a:pt x="3701" y="2532"/>
+                    <a:pt x="3701" y="1566"/>
+                  </a:cubicBezTo>
+                  <a:cubicBezTo>
+                    <a:pt x="3701" y="712"/>
+                    <a:pt x="2990" y="1"/>
+                    <a:pt x="2136" y="1"/>
+                  </a:cubicBezTo>
+                  <a:close/>
+                </a:path>
+              </a:pathLst>
+            </a:custGeom>
+            <a:solidFill>
+              <a:srgbClr val="258688"/>
+            </a:solidFill>
+            <a:ln>
+              <a:noFill/>
+            </a:ln>
+          </p:spPr>
+          <p:txBody>
+            <a:bodyPr spcFirstLastPara="1" wrap="square" lIns="91425" tIns="91425" rIns="91425" bIns="91425" anchor="ctr" anchorCtr="0">
+              <a:noAutofit/>
+            </a:bodyPr>
+            <a:lstStyle/>
+            <a:p>
+              <a:pPr marL="0" marR="0" lvl="0" indent="0" defTabSz="914400" eaLnBrk="1" fontAlgn="auto" latinLnBrk="0" hangingPunct="1">
+                <a:lnSpc>
+                  <a:spcPct val="100000"/>
+                </a:lnSpc>
+                <a:spcBef>
+                  <a:spcPts val="0"/>
+                </a:spcBef>
+                <a:spcAft>
+                  <a:spcPts val="0"/>
+                </a:spcAft>
+                <a:buClr>
+                  <a:srgbClr val="000000"/>
+                </a:buClr>
+                <a:buSzTx/>
+                <a:buFont typeface="Arial"/>
+                <a:buNone/>
+                <a:tabLst/>
+                <a:defRPr/>
+              </a:pPr>
+              <a:endParaRPr kumimoji="0" sz="1400" b="0" i="0" u="none" strike="noStrike" kern="0" cap="none" spc="0" normalizeH="0" baseline="0" noProof="0">
+                <a:ln>
+                  <a:noFill/>
+                </a:ln>
+                <a:solidFill>
+                  <a:srgbClr val="000000"/>
+                </a:solidFill>
+                <a:effectLst/>
+                <a:uLnTx/>
+                <a:uFillTx/>
+                <a:latin typeface="Arial"/>
+                <a:cs typeface="Arial"/>
+                <a:sym typeface="Arial"/>
+              </a:endParaRPr>
+            </a:p>
+          </p:txBody>
+        </p:sp>
+        <p:sp>
+          <p:nvSpPr>
+            <p:cNvPr id="22" name="Google Shape;481;p30">
+              <a:extLst>
+                <a:ext uri="{FF2B5EF4-FFF2-40B4-BE49-F238E27FC236}">
+                  <a16:creationId xmlns:a16="http://schemas.microsoft.com/office/drawing/2014/main" id="{97B78305-D019-4ED5-A8D6-BBE471266505}"/>
+                </a:ext>
+              </a:extLst>
+            </p:cNvPr>
+            <p:cNvSpPr/>
+            <p:nvPr/>
+          </p:nvSpPr>
+          <p:spPr>
+            <a:xfrm flipH="1">
+              <a:off x="10003007" y="1328593"/>
+              <a:ext cx="338897" cy="281579"/>
+            </a:xfrm>
+            <a:custGeom>
+              <a:avLst/>
+              <a:gdLst/>
+              <a:ahLst/>
+              <a:cxnLst/>
+              <a:rect l="l" t="t" r="r" b="b"/>
+              <a:pathLst>
+                <a:path w="3630" h="3170" extrusionOk="0">
+                  <a:moveTo>
+                    <a:pt x="2135" y="1"/>
+                  </a:moveTo>
+                  <a:cubicBezTo>
+                    <a:pt x="712" y="1"/>
+                    <a:pt x="0" y="1709"/>
+                    <a:pt x="997" y="2705"/>
+                  </a:cubicBezTo>
+                  <a:cubicBezTo>
+                    <a:pt x="1317" y="3026"/>
+                    <a:pt x="1704" y="3170"/>
+                    <a:pt x="2082" y="3170"/>
+                  </a:cubicBezTo>
+                  <a:cubicBezTo>
+                    <a:pt x="2877" y="3170"/>
+                    <a:pt x="3630" y="2532"/>
+                    <a:pt x="3630" y="1566"/>
+                  </a:cubicBezTo>
+                  <a:cubicBezTo>
+                    <a:pt x="3630" y="712"/>
+                    <a:pt x="2989" y="72"/>
+                    <a:pt x="2135" y="1"/>
+                  </a:cubicBezTo>
+                  <a:close/>
+                </a:path>
+              </a:pathLst>
+            </a:custGeom>
+            <a:solidFill>
+              <a:srgbClr val="42AFB6"/>
+            </a:solidFill>
+            <a:ln>
+              <a:noFill/>
+            </a:ln>
+          </p:spPr>
+          <p:txBody>
+            <a:bodyPr spcFirstLastPara="1" wrap="square" lIns="91425" tIns="91425" rIns="91425" bIns="91425" anchor="ctr" anchorCtr="0">
+              <a:noAutofit/>
+            </a:bodyPr>
+            <a:lstStyle/>
+            <a:p>
+              <a:pPr marL="0" marR="0" lvl="0" indent="0" defTabSz="914400" eaLnBrk="1" fontAlgn="auto" latinLnBrk="0" hangingPunct="1">
+                <a:lnSpc>
+                  <a:spcPct val="100000"/>
+                </a:lnSpc>
+                <a:spcBef>
+                  <a:spcPts val="0"/>
+                </a:spcBef>
+                <a:spcAft>
+                  <a:spcPts val="0"/>
+                </a:spcAft>
+                <a:buClr>
+                  <a:srgbClr val="000000"/>
+                </a:buClr>
+                <a:buSzTx/>
+                <a:buFont typeface="Arial"/>
+                <a:buNone/>
+                <a:tabLst/>
+                <a:defRPr/>
+              </a:pPr>
+              <a:endParaRPr kumimoji="0" sz="1400" b="0" i="0" u="none" strike="noStrike" kern="0" cap="none" spc="0" normalizeH="0" baseline="0" noProof="0">
+                <a:ln>
+                  <a:noFill/>
+                </a:ln>
+                <a:solidFill>
+                  <a:srgbClr val="000000"/>
+                </a:solidFill>
+                <a:effectLst/>
+                <a:uLnTx/>
+                <a:uFillTx/>
+                <a:latin typeface="Arial"/>
+                <a:cs typeface="Arial"/>
+                <a:sym typeface="Arial"/>
+              </a:endParaRPr>
+            </a:p>
+          </p:txBody>
+        </p:sp>
+      </p:grpSp>
       <p:sp>
         <p:nvSpPr>
           <p:cNvPr id="20" name="Oval 19">
@@ -49250,7 +50123,7 @@
         </p:blipFill>
         <p:spPr>
           <a:xfrm>
-            <a:off x="618156" y="1600678"/>
+            <a:off x="1471261" y="1611310"/>
             <a:ext cx="3665109" cy="3656643"/>
           </a:xfrm>
           <a:prstGeom prst="rect">
@@ -49272,7 +50145,7 @@
         </p:nvSpPr>
         <p:spPr>
           <a:xfrm>
-            <a:off x="7993980" y="5547360"/>
+            <a:off x="8004613" y="5362694"/>
             <a:ext cx="1455848" cy="369332"/>
           </a:xfrm>
           <a:prstGeom prst="rect">
@@ -49286,6 +50159,7 @@
           </a:bodyPr>
           <a:lstStyle/>
           <a:p>
+            <a:pPr algn="ctr"/>
             <a:r>
               <a:rPr lang="pt-PT" sz="1800" b="1" dirty="0" err="1"/>
               <a:t>Corner</a:t>
@@ -49329,8 +50203,8 @@
         </p:blipFill>
         <p:spPr>
           <a:xfrm>
-            <a:off x="6634480" y="1289841"/>
-            <a:ext cx="1564640" cy="1640840"/>
+            <a:off x="6870896" y="1611310"/>
+            <a:ext cx="1610659" cy="1689100"/>
           </a:xfrm>
           <a:prstGeom prst="rect">
             <a:avLst/>
@@ -49364,7 +50238,7 @@
         </p:blipFill>
         <p:spPr>
           <a:xfrm>
-            <a:off x="9184640" y="1241581"/>
+            <a:off x="8958321" y="1611310"/>
             <a:ext cx="1564640" cy="1689100"/>
           </a:xfrm>
           <a:prstGeom prst="rect">
@@ -49399,8 +50273,8 @@
         </p:blipFill>
         <p:spPr>
           <a:xfrm>
-            <a:off x="6634480" y="3568221"/>
-            <a:ext cx="1564640" cy="1640840"/>
+            <a:off x="6870896" y="3578855"/>
+            <a:ext cx="1610659" cy="1689100"/>
           </a:xfrm>
           <a:prstGeom prst="rect">
             <a:avLst/>
@@ -49434,7 +50308,7 @@
         </p:blipFill>
         <p:spPr>
           <a:xfrm>
-            <a:off x="9184639" y="3568221"/>
+            <a:off x="8958321" y="3578853"/>
             <a:ext cx="1564641" cy="1689100"/>
           </a:xfrm>
           <a:prstGeom prst="rect">
@@ -49456,7 +50330,7 @@
         </p:nvSpPr>
         <p:spPr>
           <a:xfrm>
-            <a:off x="1471261" y="5547360"/>
+            <a:off x="2171966" y="5362694"/>
             <a:ext cx="2263697" cy="369332"/>
           </a:xfrm>
           <a:prstGeom prst="rect">
@@ -49470,6 +50344,7 @@
           </a:bodyPr>
           <a:lstStyle/>
           <a:p>
+            <a:pPr algn="ctr"/>
             <a:r>
               <a:rPr lang="pt-PT" sz="1800" b="1" dirty="0" err="1"/>
               <a:t>Canny</a:t>

</xml_diff>